<commit_message>
High-level editing pass through depl & oper guides
</commit_message>
<xml_diff>
--- a/docs/deployment_guide/images/amc-architecture-diagram.pptx
+++ b/docs/deployment_guide/images/amc-architecture-diagram.pptx
@@ -5,7 +5,8 @@
     <p:sldMasterId id="2147483648" r:id="rId1"/>
   </p:sldMasterIdLst>
   <p:sldIdLst>
-    <p:sldId id="256" r:id="rId2"/>
+    <p:sldId id="258" r:id="rId2"/>
+    <p:sldId id="257" r:id="rId3"/>
   </p:sldIdLst>
   <p:sldSz cx="12192000" cy="6858000"/>
   <p:notesSz cx="6858000" cy="9144000"/>
@@ -105,6 +106,20 @@
     </a:lvl9pPr>
   </p:defaultTextStyle>
   <p:extLst>
+    <p:ext uri="{521415D9-36F7-43E2-AB2F-B90AF26B5E84}">
+      <p14:sectionLst xmlns:p14="http://schemas.microsoft.com/office/powerpoint/2010/main">
+        <p14:section name="Default Section" id="{385A93DC-3DDD-454B-B4BF-42977CF58664}">
+          <p14:sldIdLst>
+            <p14:sldId id="258"/>
+          </p14:sldIdLst>
+        </p14:section>
+        <p14:section name="OLD—For reference only" id="{4F835FD7-AE94-42D6-8E18-FEBAEA148851}">
+          <p14:sldIdLst>
+            <p14:sldId id="257"/>
+          </p14:sldIdLst>
+        </p14:section>
+      </p14:sectionLst>
+    </p:ext>
     <p:ext uri="{EFAFB233-063F-42B5-8137-9DF3F51BA10A}">
       <p15:sldGuideLst xmlns:p15="http://schemas.microsoft.com/office/powerpoint/2012/main"/>
     </p:ext>
@@ -259,7 +274,7 @@
           <a:p>
             <a:fld id="{A147B2E2-C350-F942-A156-70B4194DDDD8}" type="datetimeFigureOut">
               <a:rPr lang="en-US" smtClean="0"/>
-              <a:t>11/21/22</a:t>
+              <a:t>11/21/2022</a:t>
             </a:fld>
             <a:endParaRPr lang="en-US"/>
           </a:p>
@@ -457,7 +472,7 @@
           <a:p>
             <a:fld id="{A147B2E2-C350-F942-A156-70B4194DDDD8}" type="datetimeFigureOut">
               <a:rPr lang="en-US" smtClean="0"/>
-              <a:t>11/21/22</a:t>
+              <a:t>11/21/2022</a:t>
             </a:fld>
             <a:endParaRPr lang="en-US"/>
           </a:p>
@@ -665,7 +680,7 @@
           <a:p>
             <a:fld id="{A147B2E2-C350-F942-A156-70B4194DDDD8}" type="datetimeFigureOut">
               <a:rPr lang="en-US" smtClean="0"/>
-              <a:t>11/21/22</a:t>
+              <a:t>11/21/2022</a:t>
             </a:fld>
             <a:endParaRPr lang="en-US"/>
           </a:p>
@@ -863,7 +878,7 @@
           <a:p>
             <a:fld id="{A147B2E2-C350-F942-A156-70B4194DDDD8}" type="datetimeFigureOut">
               <a:rPr lang="en-US" smtClean="0"/>
-              <a:t>11/21/22</a:t>
+              <a:t>11/21/2022</a:t>
             </a:fld>
             <a:endParaRPr lang="en-US"/>
           </a:p>
@@ -1138,7 +1153,7 @@
           <a:p>
             <a:fld id="{A147B2E2-C350-F942-A156-70B4194DDDD8}" type="datetimeFigureOut">
               <a:rPr lang="en-US" smtClean="0"/>
-              <a:t>11/21/22</a:t>
+              <a:t>11/21/2022</a:t>
             </a:fld>
             <a:endParaRPr lang="en-US"/>
           </a:p>
@@ -1403,7 +1418,7 @@
           <a:p>
             <a:fld id="{A147B2E2-C350-F942-A156-70B4194DDDD8}" type="datetimeFigureOut">
               <a:rPr lang="en-US" smtClean="0"/>
-              <a:t>11/21/22</a:t>
+              <a:t>11/21/2022</a:t>
             </a:fld>
             <a:endParaRPr lang="en-US"/>
           </a:p>
@@ -1815,7 +1830,7 @@
           <a:p>
             <a:fld id="{A147B2E2-C350-F942-A156-70B4194DDDD8}" type="datetimeFigureOut">
               <a:rPr lang="en-US" smtClean="0"/>
-              <a:t>11/21/22</a:t>
+              <a:t>11/21/2022</a:t>
             </a:fld>
             <a:endParaRPr lang="en-US"/>
           </a:p>
@@ -1956,7 +1971,7 @@
           <a:p>
             <a:fld id="{A147B2E2-C350-F942-A156-70B4194DDDD8}" type="datetimeFigureOut">
               <a:rPr lang="en-US" smtClean="0"/>
-              <a:t>11/21/22</a:t>
+              <a:t>11/21/2022</a:t>
             </a:fld>
             <a:endParaRPr lang="en-US"/>
           </a:p>
@@ -2069,7 +2084,7 @@
           <a:p>
             <a:fld id="{A147B2E2-C350-F942-A156-70B4194DDDD8}" type="datetimeFigureOut">
               <a:rPr lang="en-US" smtClean="0"/>
-              <a:t>11/21/22</a:t>
+              <a:t>11/21/2022</a:t>
             </a:fld>
             <a:endParaRPr lang="en-US"/>
           </a:p>
@@ -2380,7 +2395,7 @@
           <a:p>
             <a:fld id="{A147B2E2-C350-F942-A156-70B4194DDDD8}" type="datetimeFigureOut">
               <a:rPr lang="en-US" smtClean="0"/>
-              <a:t>11/21/22</a:t>
+              <a:t>11/21/2022</a:t>
             </a:fld>
             <a:endParaRPr lang="en-US"/>
           </a:p>
@@ -2668,7 +2683,7 @@
           <a:p>
             <a:fld id="{A147B2E2-C350-F942-A156-70B4194DDDD8}" type="datetimeFigureOut">
               <a:rPr lang="en-US" smtClean="0"/>
-              <a:t>11/21/22</a:t>
+              <a:t>11/21/2022</a:t>
             </a:fld>
             <a:endParaRPr lang="en-US"/>
           </a:p>
@@ -2909,7 +2924,7 @@
           <a:p>
             <a:fld id="{A147B2E2-C350-F942-A156-70B4194DDDD8}" type="datetimeFigureOut">
               <a:rPr lang="en-US" smtClean="0"/>
-              <a:t>11/21/22</a:t>
+              <a:t>11/21/2022</a:t>
             </a:fld>
             <a:endParaRPr lang="en-US"/>
           </a:p>
@@ -3326,6 +3341,2095 @@
           <a:chExt cx="0" cy="0"/>
         </a:xfrm>
       </p:grpSpPr>
+      <p:sp>
+        <p:nvSpPr>
+          <p:cNvPr id="4" name="Rectangle 3">
+            <a:extLst>
+              <a:ext uri="{FF2B5EF4-FFF2-40B4-BE49-F238E27FC236}">
+                <a16:creationId xmlns:a16="http://schemas.microsoft.com/office/drawing/2014/main" id="{9D1A91C9-3A6B-4586-8CA7-0ED869EC3DF4}"/>
+              </a:ext>
+            </a:extLst>
+          </p:cNvPr>
+          <p:cNvSpPr/>
+          <p:nvPr/>
+        </p:nvSpPr>
+        <p:spPr>
+          <a:xfrm>
+            <a:off x="1568175" y="787155"/>
+            <a:ext cx="9752495" cy="5653400"/>
+          </a:xfrm>
+          <a:prstGeom prst="rect">
+            <a:avLst/>
+          </a:prstGeom>
+          <a:noFill/>
+          <a:ln w="12700">
+            <a:solidFill>
+              <a:schemeClr val="tx1"/>
+            </a:solidFill>
+          </a:ln>
+        </p:spPr>
+        <p:style>
+          <a:lnRef idx="2">
+            <a:schemeClr val="accent1">
+              <a:shade val="50000"/>
+            </a:schemeClr>
+          </a:lnRef>
+          <a:fillRef idx="1">
+            <a:schemeClr val="accent1"/>
+          </a:fillRef>
+          <a:effectRef idx="0">
+            <a:schemeClr val="accent1"/>
+          </a:effectRef>
+          <a:fontRef idx="minor">
+            <a:schemeClr val="lt1"/>
+          </a:fontRef>
+        </p:style>
+        <p:txBody>
+          <a:bodyPr lIns="502920" tIns="91440"/>
+          <a:lstStyle/>
+          <a:p>
+            <a:pPr eaLnBrk="1" fontAlgn="auto" hangingPunct="1">
+              <a:spcBef>
+                <a:spcPts val="0"/>
+              </a:spcBef>
+              <a:spcAft>
+                <a:spcPts val="0"/>
+              </a:spcAft>
+              <a:defRPr/>
+            </a:pPr>
+            <a:r>
+              <a:rPr lang="en-US" sz="1200" dirty="0">
+                <a:solidFill>
+                  <a:sysClr val="windowText" lastClr="000000"/>
+                </a:solidFill>
+                <a:latin typeface="Arial" panose="020B0604020202020204" pitchFamily="34" charset="0"/>
+                <a:cs typeface="Arial" panose="020B0604020202020204" pitchFamily="34" charset="0"/>
+              </a:rPr>
+              <a:t>AWS Cloud</a:t>
+            </a:r>
+          </a:p>
+        </p:txBody>
+      </p:sp>
+      <p:sp>
+        <p:nvSpPr>
+          <p:cNvPr id="5" name="Rectangle 4">
+            <a:extLst>
+              <a:ext uri="{FF2B5EF4-FFF2-40B4-BE49-F238E27FC236}">
+                <a16:creationId xmlns:a16="http://schemas.microsoft.com/office/drawing/2014/main" id="{5FD9135C-8D58-44DB-9C6A-CEF259F3F9B1}"/>
+              </a:ext>
+            </a:extLst>
+          </p:cNvPr>
+          <p:cNvSpPr/>
+          <p:nvPr/>
+        </p:nvSpPr>
+        <p:spPr>
+          <a:xfrm>
+            <a:off x="7715528" y="4883259"/>
+            <a:ext cx="1765300" cy="889002"/>
+          </a:xfrm>
+          <a:prstGeom prst="rect">
+            <a:avLst/>
+          </a:prstGeom>
+          <a:noFill/>
+          <a:ln w="12700">
+            <a:solidFill>
+              <a:srgbClr val="5A6B86"/>
+            </a:solidFill>
+            <a:prstDash val="dash"/>
+          </a:ln>
+        </p:spPr>
+        <p:style>
+          <a:lnRef idx="2">
+            <a:schemeClr val="accent1">
+              <a:shade val="50000"/>
+            </a:schemeClr>
+          </a:lnRef>
+          <a:fillRef idx="1">
+            <a:schemeClr val="accent1"/>
+          </a:fillRef>
+          <a:effectRef idx="0">
+            <a:schemeClr val="accent1"/>
+          </a:effectRef>
+          <a:fontRef idx="minor">
+            <a:schemeClr val="lt1"/>
+          </a:fontRef>
+        </p:style>
+        <p:txBody>
+          <a:bodyPr tIns="91440"/>
+          <a:lstStyle/>
+          <a:p>
+            <a:pPr algn="ctr" eaLnBrk="1" fontAlgn="auto" hangingPunct="1">
+              <a:spcBef>
+                <a:spcPts val="0"/>
+              </a:spcBef>
+              <a:spcAft>
+                <a:spcPts val="0"/>
+              </a:spcAft>
+              <a:defRPr/>
+            </a:pPr>
+            <a:r>
+              <a:rPr lang="en-US" sz="1200" dirty="0">
+                <a:solidFill>
+                  <a:srgbClr val="5A6B86"/>
+                </a:solidFill>
+                <a:latin typeface="Arial" panose="020B0604020202020204" pitchFamily="34" charset="0"/>
+                <a:cs typeface="Arial" panose="020B0604020202020204" pitchFamily="34" charset="0"/>
+              </a:rPr>
+              <a:t>Analytics</a:t>
+            </a:r>
+          </a:p>
+        </p:txBody>
+      </p:sp>
+      <p:pic>
+        <p:nvPicPr>
+          <p:cNvPr id="6" name="Graphic 5">
+            <a:extLst>
+              <a:ext uri="{FF2B5EF4-FFF2-40B4-BE49-F238E27FC236}">
+                <a16:creationId xmlns:a16="http://schemas.microsoft.com/office/drawing/2014/main" id="{D388633F-8982-4C37-9B9C-98D06F62A168}"/>
+              </a:ext>
+            </a:extLst>
+          </p:cNvPr>
+          <p:cNvPicPr>
+            <a:picLocks noChangeAspect="1"/>
+          </p:cNvPicPr>
+          <p:nvPr/>
+        </p:nvPicPr>
+        <p:blipFill>
+          <a:blip r:embed="rId2">
+            <a:extLst>
+              <a:ext uri="{96DAC541-7B7A-43D3-8B79-37D633B846F1}">
+                <asvg:svgBlip xmlns:asvg="http://schemas.microsoft.com/office/drawing/2016/SVG/main" r:embed="rId3"/>
+              </a:ext>
+            </a:extLst>
+          </a:blip>
+          <a:srcRect/>
+          <a:stretch/>
+        </p:blipFill>
+        <p:spPr>
+          <a:xfrm>
+            <a:off x="1568176" y="787154"/>
+            <a:ext cx="381000" cy="381000"/>
+          </a:xfrm>
+          <a:prstGeom prst="rect">
+            <a:avLst/>
+          </a:prstGeom>
+        </p:spPr>
+      </p:pic>
+      <p:pic>
+        <p:nvPicPr>
+          <p:cNvPr id="7" name="Graphic 11">
+            <a:extLst>
+              <a:ext uri="{FF2B5EF4-FFF2-40B4-BE49-F238E27FC236}">
+                <a16:creationId xmlns:a16="http://schemas.microsoft.com/office/drawing/2014/main" id="{985D40B8-C42D-4964-9AE2-0F9CB39D7F10}"/>
+              </a:ext>
+            </a:extLst>
+          </p:cNvPr>
+          <p:cNvPicPr>
+            <a:picLocks noChangeAspect="1" noChangeArrowheads="1"/>
+          </p:cNvPicPr>
+          <p:nvPr/>
+        </p:nvPicPr>
+        <p:blipFill>
+          <a:blip r:embed="rId4">
+            <a:extLst>
+              <a:ext uri="{28A0092B-C50C-407E-A947-70E740481C1C}">
+                <a14:useLocalDpi xmlns:a14="http://schemas.microsoft.com/office/drawing/2010/main" val="0"/>
+              </a:ext>
+            </a:extLst>
+          </a:blip>
+          <a:srcRect/>
+          <a:stretch>
+            <a:fillRect/>
+          </a:stretch>
+        </p:blipFill>
+        <p:spPr bwMode="auto">
+          <a:xfrm>
+            <a:off x="798159" y="4679604"/>
+            <a:ext cx="469900" cy="469900"/>
+          </a:xfrm>
+          <a:prstGeom prst="rect">
+            <a:avLst/>
+          </a:prstGeom>
+          <a:noFill/>
+          <a:ln>
+            <a:noFill/>
+          </a:ln>
+          <a:extLst>
+            <a:ext uri="{909E8E84-426E-40DD-AFC4-6F175D3DCCD1}">
+              <a14:hiddenFill xmlns:a14="http://schemas.microsoft.com/office/drawing/2010/main">
+                <a:solidFill>
+                  <a:srgbClr val="FFFFFF"/>
+                </a:solidFill>
+              </a14:hiddenFill>
+            </a:ext>
+            <a:ext uri="{91240B29-F687-4F45-9708-019B960494DF}">
+              <a14:hiddenLine xmlns:a14="http://schemas.microsoft.com/office/drawing/2010/main" w="9525">
+                <a:solidFill>
+                  <a:srgbClr val="000000"/>
+                </a:solidFill>
+                <a:miter lim="800000"/>
+                <a:headEnd/>
+                <a:tailEnd/>
+              </a14:hiddenLine>
+            </a:ext>
+          </a:extLst>
+        </p:spPr>
+      </p:pic>
+      <p:sp>
+        <p:nvSpPr>
+          <p:cNvPr id="8" name="TextBox 28">
+            <a:extLst>
+              <a:ext uri="{FF2B5EF4-FFF2-40B4-BE49-F238E27FC236}">
+                <a16:creationId xmlns:a16="http://schemas.microsoft.com/office/drawing/2014/main" id="{5941C0ED-C551-4222-BB36-D3C2238A3981}"/>
+              </a:ext>
+            </a:extLst>
+          </p:cNvPr>
+          <p:cNvSpPr txBox="1">
+            <a:spLocks noChangeArrowheads="1"/>
+          </p:cNvSpPr>
+          <p:nvPr/>
+        </p:nvSpPr>
+        <p:spPr bwMode="auto">
+          <a:xfrm>
+            <a:off x="496534" y="5138669"/>
+            <a:ext cx="1073150" cy="600164"/>
+          </a:xfrm>
+          <a:prstGeom prst="rect">
+            <a:avLst/>
+          </a:prstGeom>
+          <a:noFill/>
+          <a:ln>
+            <a:noFill/>
+          </a:ln>
+          <a:extLst>
+            <a:ext uri="{909E8E84-426E-40DD-AFC4-6F175D3DCCD1}">
+              <a14:hiddenFill xmlns:a14="http://schemas.microsoft.com/office/drawing/2010/main">
+                <a:solidFill>
+                  <a:srgbClr val="FFFFFF"/>
+                </a:solidFill>
+              </a14:hiddenFill>
+            </a:ext>
+            <a:ext uri="{91240B29-F687-4F45-9708-019B960494DF}">
+              <a14:hiddenLine xmlns:a14="http://schemas.microsoft.com/office/drawing/2010/main" w="9525">
+                <a:solidFill>
+                  <a:srgbClr val="000000"/>
+                </a:solidFill>
+                <a:miter lim="800000"/>
+                <a:headEnd/>
+                <a:tailEnd/>
+              </a14:hiddenLine>
+            </a:ext>
+          </a:extLst>
+        </p:spPr>
+        <p:txBody>
+          <a:bodyPr>
+            <a:spAutoFit/>
+          </a:bodyPr>
+          <a:lstStyle>
+            <a:lvl1pPr>
+              <a:defRPr>
+                <a:solidFill>
+                  <a:schemeClr val="tx1"/>
+                </a:solidFill>
+                <a:latin typeface="Calibri" panose="020F0502020204030204" pitchFamily="34" charset="0"/>
+              </a:defRPr>
+            </a:lvl1pPr>
+            <a:lvl2pPr marL="742950" indent="-285750">
+              <a:defRPr>
+                <a:solidFill>
+                  <a:schemeClr val="tx1"/>
+                </a:solidFill>
+                <a:latin typeface="Calibri" panose="020F0502020204030204" pitchFamily="34" charset="0"/>
+              </a:defRPr>
+            </a:lvl2pPr>
+            <a:lvl3pPr marL="1143000" indent="-228600">
+              <a:defRPr>
+                <a:solidFill>
+                  <a:schemeClr val="tx1"/>
+                </a:solidFill>
+                <a:latin typeface="Calibri" panose="020F0502020204030204" pitchFamily="34" charset="0"/>
+              </a:defRPr>
+            </a:lvl3pPr>
+            <a:lvl4pPr marL="1600200" indent="-228600">
+              <a:defRPr>
+                <a:solidFill>
+                  <a:schemeClr val="tx1"/>
+                </a:solidFill>
+                <a:latin typeface="Calibri" panose="020F0502020204030204" pitchFamily="34" charset="0"/>
+              </a:defRPr>
+            </a:lvl4pPr>
+            <a:lvl5pPr marL="2057400" indent="-228600">
+              <a:defRPr>
+                <a:solidFill>
+                  <a:schemeClr val="tx1"/>
+                </a:solidFill>
+                <a:latin typeface="Calibri" panose="020F0502020204030204" pitchFamily="34" charset="0"/>
+              </a:defRPr>
+            </a:lvl5pPr>
+            <a:lvl6pPr marL="2514600" indent="-228600" eaLnBrk="0" fontAlgn="base" hangingPunct="0">
+              <a:spcBef>
+                <a:spcPct val="0"/>
+              </a:spcBef>
+              <a:spcAft>
+                <a:spcPct val="0"/>
+              </a:spcAft>
+              <a:defRPr>
+                <a:solidFill>
+                  <a:schemeClr val="tx1"/>
+                </a:solidFill>
+                <a:latin typeface="Calibri" panose="020F0502020204030204" pitchFamily="34" charset="0"/>
+              </a:defRPr>
+            </a:lvl6pPr>
+            <a:lvl7pPr marL="2971800" indent="-228600" eaLnBrk="0" fontAlgn="base" hangingPunct="0">
+              <a:spcBef>
+                <a:spcPct val="0"/>
+              </a:spcBef>
+              <a:spcAft>
+                <a:spcPct val="0"/>
+              </a:spcAft>
+              <a:defRPr>
+                <a:solidFill>
+                  <a:schemeClr val="tx1"/>
+                </a:solidFill>
+                <a:latin typeface="Calibri" panose="020F0502020204030204" pitchFamily="34" charset="0"/>
+              </a:defRPr>
+            </a:lvl7pPr>
+            <a:lvl8pPr marL="3429000" indent="-228600" eaLnBrk="0" fontAlgn="base" hangingPunct="0">
+              <a:spcBef>
+                <a:spcPct val="0"/>
+              </a:spcBef>
+              <a:spcAft>
+                <a:spcPct val="0"/>
+              </a:spcAft>
+              <a:defRPr>
+                <a:solidFill>
+                  <a:schemeClr val="tx1"/>
+                </a:solidFill>
+                <a:latin typeface="Calibri" panose="020F0502020204030204" pitchFamily="34" charset="0"/>
+              </a:defRPr>
+            </a:lvl8pPr>
+            <a:lvl9pPr marL="3886200" indent="-228600" eaLnBrk="0" fontAlgn="base" hangingPunct="0">
+              <a:spcBef>
+                <a:spcPct val="0"/>
+              </a:spcBef>
+              <a:spcAft>
+                <a:spcPct val="0"/>
+              </a:spcAft>
+              <a:defRPr>
+                <a:solidFill>
+                  <a:schemeClr val="tx1"/>
+                </a:solidFill>
+                <a:latin typeface="Calibri" panose="020F0502020204030204" pitchFamily="34" charset="0"/>
+              </a:defRPr>
+            </a:lvl9pPr>
+          </a:lstStyle>
+          <a:p>
+            <a:pPr algn="ctr" eaLnBrk="1" hangingPunct="1"/>
+            <a:r>
+              <a:rPr lang="en-US" altLang="en-US" sz="1100" dirty="0">
+                <a:solidFill>
+                  <a:srgbClr val="000000"/>
+                </a:solidFill>
+                <a:latin typeface="Arial" panose="020B0604020202020204" pitchFamily="34" charset="0"/>
+                <a:cs typeface="Arial" panose="020B0604020202020204" pitchFamily="34" charset="0"/>
+              </a:rPr>
+              <a:t>Amazon Marketing Cloud</a:t>
+            </a:r>
+          </a:p>
+        </p:txBody>
+      </p:sp>
+      <p:sp>
+        <p:nvSpPr>
+          <p:cNvPr id="10" name="Rectangle 9">
+            <a:extLst>
+              <a:ext uri="{FF2B5EF4-FFF2-40B4-BE49-F238E27FC236}">
+                <a16:creationId xmlns:a16="http://schemas.microsoft.com/office/drawing/2014/main" id="{54F92F85-9B95-400A-9861-18CC03FBF260}"/>
+              </a:ext>
+            </a:extLst>
+          </p:cNvPr>
+          <p:cNvSpPr/>
+          <p:nvPr/>
+        </p:nvSpPr>
+        <p:spPr>
+          <a:xfrm>
+            <a:off x="1752445" y="1252329"/>
+            <a:ext cx="4585761" cy="5111401"/>
+          </a:xfrm>
+          <a:prstGeom prst="rect">
+            <a:avLst/>
+          </a:prstGeom>
+          <a:noFill/>
+          <a:ln w="12700">
+            <a:solidFill>
+              <a:srgbClr val="5A6B86"/>
+            </a:solidFill>
+            <a:prstDash val="dash"/>
+          </a:ln>
+        </p:spPr>
+        <p:style>
+          <a:lnRef idx="2">
+            <a:schemeClr val="accent1">
+              <a:shade val="50000"/>
+            </a:schemeClr>
+          </a:lnRef>
+          <a:fillRef idx="1">
+            <a:schemeClr val="accent1"/>
+          </a:fillRef>
+          <a:effectRef idx="0">
+            <a:schemeClr val="accent1"/>
+          </a:effectRef>
+          <a:fontRef idx="minor">
+            <a:schemeClr val="lt1"/>
+          </a:fontRef>
+        </p:style>
+        <p:txBody>
+          <a:bodyPr tIns="91440"/>
+          <a:lstStyle/>
+          <a:p>
+            <a:pPr algn="ctr" eaLnBrk="1" fontAlgn="auto" hangingPunct="1">
+              <a:spcBef>
+                <a:spcPts val="0"/>
+              </a:spcBef>
+              <a:spcAft>
+                <a:spcPts val="0"/>
+              </a:spcAft>
+              <a:defRPr/>
+            </a:pPr>
+            <a:r>
+              <a:rPr lang="en-US" sz="1200" dirty="0">
+                <a:solidFill>
+                  <a:srgbClr val="5A6B86"/>
+                </a:solidFill>
+                <a:latin typeface="Arial" panose="020B0604020202020204" pitchFamily="34" charset="0"/>
+                <a:cs typeface="Arial" panose="020B0604020202020204" pitchFamily="34" charset="0"/>
+              </a:rPr>
+              <a:t>Microservices</a:t>
+            </a:r>
+          </a:p>
+        </p:txBody>
+      </p:sp>
+      <p:sp>
+        <p:nvSpPr>
+          <p:cNvPr id="11" name="Rectangle 10">
+            <a:extLst>
+              <a:ext uri="{FF2B5EF4-FFF2-40B4-BE49-F238E27FC236}">
+                <a16:creationId xmlns:a16="http://schemas.microsoft.com/office/drawing/2014/main" id="{467559CD-1AF6-4931-9553-008CB4ADC671}"/>
+              </a:ext>
+            </a:extLst>
+          </p:cNvPr>
+          <p:cNvSpPr/>
+          <p:nvPr/>
+        </p:nvSpPr>
+        <p:spPr>
+          <a:xfrm>
+            <a:off x="7637106" y="1455957"/>
+            <a:ext cx="1765300" cy="889002"/>
+          </a:xfrm>
+          <a:prstGeom prst="rect">
+            <a:avLst/>
+          </a:prstGeom>
+          <a:noFill/>
+          <a:ln w="12700">
+            <a:solidFill>
+              <a:srgbClr val="5A6B86"/>
+            </a:solidFill>
+            <a:prstDash val="dash"/>
+          </a:ln>
+        </p:spPr>
+        <p:style>
+          <a:lnRef idx="2">
+            <a:schemeClr val="accent1">
+              <a:shade val="50000"/>
+            </a:schemeClr>
+          </a:lnRef>
+          <a:fillRef idx="1">
+            <a:schemeClr val="accent1"/>
+          </a:fillRef>
+          <a:effectRef idx="0">
+            <a:schemeClr val="accent1"/>
+          </a:effectRef>
+          <a:fontRef idx="minor">
+            <a:schemeClr val="lt1"/>
+          </a:fontRef>
+        </p:style>
+        <p:txBody>
+          <a:bodyPr tIns="91440"/>
+          <a:lstStyle/>
+          <a:p>
+            <a:pPr algn="ctr" eaLnBrk="1" fontAlgn="auto" hangingPunct="1">
+              <a:spcBef>
+                <a:spcPts val="0"/>
+              </a:spcBef>
+              <a:spcAft>
+                <a:spcPts val="0"/>
+              </a:spcAft>
+              <a:defRPr/>
+            </a:pPr>
+            <a:r>
+              <a:rPr lang="en-US" sz="1200" dirty="0">
+                <a:solidFill>
+                  <a:srgbClr val="5A6B86"/>
+                </a:solidFill>
+                <a:latin typeface="Arial" panose="020B0604020202020204" pitchFamily="34" charset="0"/>
+                <a:cs typeface="Arial" panose="020B0604020202020204" pitchFamily="34" charset="0"/>
+              </a:rPr>
+              <a:t>Data lake</a:t>
+            </a:r>
+          </a:p>
+        </p:txBody>
+      </p:sp>
+      <p:sp>
+        <p:nvSpPr>
+          <p:cNvPr id="13" name="Rectangle 12">
+            <a:extLst>
+              <a:ext uri="{FF2B5EF4-FFF2-40B4-BE49-F238E27FC236}">
+                <a16:creationId xmlns:a16="http://schemas.microsoft.com/office/drawing/2014/main" id="{C71CFF81-8A69-4EAC-926B-EF1EE0A43BF6}"/>
+              </a:ext>
+            </a:extLst>
+          </p:cNvPr>
+          <p:cNvSpPr/>
+          <p:nvPr/>
+        </p:nvSpPr>
+        <p:spPr>
+          <a:xfrm>
+            <a:off x="3845489" y="4809431"/>
+            <a:ext cx="2352366" cy="1481328"/>
+          </a:xfrm>
+          <a:prstGeom prst="rect">
+            <a:avLst/>
+          </a:prstGeom>
+          <a:solidFill>
+            <a:srgbClr val="5A6B86">
+              <a:alpha val="9804"/>
+            </a:srgbClr>
+          </a:solidFill>
+          <a:ln w="12700">
+            <a:noFill/>
+            <a:prstDash val="dash"/>
+          </a:ln>
+        </p:spPr>
+        <p:style>
+          <a:lnRef idx="2">
+            <a:schemeClr val="accent1">
+              <a:shade val="50000"/>
+            </a:schemeClr>
+          </a:lnRef>
+          <a:fillRef idx="1">
+            <a:schemeClr val="accent1"/>
+          </a:fillRef>
+          <a:effectRef idx="0">
+            <a:schemeClr val="accent1"/>
+          </a:effectRef>
+          <a:fontRef idx="minor">
+            <a:schemeClr val="lt1"/>
+          </a:fontRef>
+        </p:style>
+        <p:txBody>
+          <a:bodyPr tIns="91440"/>
+          <a:lstStyle/>
+          <a:p>
+            <a:pPr algn="ctr" eaLnBrk="1" fontAlgn="auto" hangingPunct="1">
+              <a:spcBef>
+                <a:spcPts val="0"/>
+              </a:spcBef>
+              <a:spcAft>
+                <a:spcPts val="0"/>
+              </a:spcAft>
+              <a:defRPr/>
+            </a:pPr>
+            <a:r>
+              <a:rPr lang="en-US" sz="1200" dirty="0">
+                <a:solidFill>
+                  <a:schemeClr val="tx1"/>
+                </a:solidFill>
+                <a:latin typeface="Arial" panose="020B0604020202020204" pitchFamily="34" charset="0"/>
+                <a:cs typeface="Arial" panose="020B0604020202020204" pitchFamily="34" charset="0"/>
+              </a:rPr>
+              <a:t>Workflow Management Service</a:t>
+            </a:r>
+          </a:p>
+        </p:txBody>
+      </p:sp>
+      <p:sp>
+        <p:nvSpPr>
+          <p:cNvPr id="14" name="Rectangle 13">
+            <a:extLst>
+              <a:ext uri="{FF2B5EF4-FFF2-40B4-BE49-F238E27FC236}">
+                <a16:creationId xmlns:a16="http://schemas.microsoft.com/office/drawing/2014/main" id="{3E4024ED-872A-4755-844D-F9D5EEA64333}"/>
+              </a:ext>
+            </a:extLst>
+          </p:cNvPr>
+          <p:cNvSpPr/>
+          <p:nvPr/>
+        </p:nvSpPr>
+        <p:spPr>
+          <a:xfrm>
+            <a:off x="1845318" y="3197282"/>
+            <a:ext cx="2356647" cy="1481328"/>
+          </a:xfrm>
+          <a:prstGeom prst="rect">
+            <a:avLst/>
+          </a:prstGeom>
+          <a:solidFill>
+            <a:srgbClr val="5A6B86">
+              <a:alpha val="9804"/>
+            </a:srgbClr>
+          </a:solidFill>
+          <a:ln w="12700">
+            <a:noFill/>
+            <a:prstDash val="dash"/>
+          </a:ln>
+        </p:spPr>
+        <p:style>
+          <a:lnRef idx="2">
+            <a:schemeClr val="accent1">
+              <a:shade val="50000"/>
+            </a:schemeClr>
+          </a:lnRef>
+          <a:fillRef idx="1">
+            <a:schemeClr val="accent1"/>
+          </a:fillRef>
+          <a:effectRef idx="0">
+            <a:schemeClr val="accent1"/>
+          </a:effectRef>
+          <a:fontRef idx="minor">
+            <a:schemeClr val="lt1"/>
+          </a:fontRef>
+        </p:style>
+        <p:txBody>
+          <a:bodyPr tIns="91440"/>
+          <a:lstStyle/>
+          <a:p>
+            <a:pPr algn="ctr" eaLnBrk="1" fontAlgn="auto" hangingPunct="1">
+              <a:spcBef>
+                <a:spcPts val="0"/>
+              </a:spcBef>
+              <a:spcAft>
+                <a:spcPts val="0"/>
+              </a:spcAft>
+              <a:defRPr/>
+            </a:pPr>
+            <a:r>
+              <a:rPr lang="en-US" sz="1200" dirty="0">
+                <a:solidFill>
+                  <a:schemeClr val="tx1"/>
+                </a:solidFill>
+                <a:latin typeface="Arial" panose="020B0604020202020204" pitchFamily="34" charset="0"/>
+                <a:cs typeface="Arial" panose="020B0604020202020204" pitchFamily="34" charset="0"/>
+              </a:rPr>
+              <a:t>Platform Management Service</a:t>
+            </a:r>
+          </a:p>
+        </p:txBody>
+      </p:sp>
+      <p:sp>
+        <p:nvSpPr>
+          <p:cNvPr id="15" name="Rectangle 14">
+            <a:extLst>
+              <a:ext uri="{FF2B5EF4-FFF2-40B4-BE49-F238E27FC236}">
+                <a16:creationId xmlns:a16="http://schemas.microsoft.com/office/drawing/2014/main" id="{F3E37B90-69C5-4AFE-B810-00159098C62C}"/>
+              </a:ext>
+            </a:extLst>
+          </p:cNvPr>
+          <p:cNvSpPr/>
+          <p:nvPr/>
+        </p:nvSpPr>
+        <p:spPr>
+          <a:xfrm>
+            <a:off x="3845488" y="1600201"/>
+            <a:ext cx="2353576" cy="1480930"/>
+          </a:xfrm>
+          <a:prstGeom prst="rect">
+            <a:avLst/>
+          </a:prstGeom>
+          <a:solidFill>
+            <a:srgbClr val="5A6B86">
+              <a:alpha val="9804"/>
+            </a:srgbClr>
+          </a:solidFill>
+          <a:ln w="12700">
+            <a:noFill/>
+            <a:prstDash val="dash"/>
+          </a:ln>
+        </p:spPr>
+        <p:style>
+          <a:lnRef idx="2">
+            <a:schemeClr val="accent1">
+              <a:shade val="50000"/>
+            </a:schemeClr>
+          </a:lnRef>
+          <a:fillRef idx="1">
+            <a:schemeClr val="accent1"/>
+          </a:fillRef>
+          <a:effectRef idx="0">
+            <a:schemeClr val="accent1"/>
+          </a:effectRef>
+          <a:fontRef idx="minor">
+            <a:schemeClr val="lt1"/>
+          </a:fontRef>
+        </p:style>
+        <p:txBody>
+          <a:bodyPr tIns="91440"/>
+          <a:lstStyle/>
+          <a:p>
+            <a:pPr algn="ctr" eaLnBrk="1" fontAlgn="auto" hangingPunct="1">
+              <a:spcBef>
+                <a:spcPts val="0"/>
+              </a:spcBef>
+              <a:spcAft>
+                <a:spcPts val="0"/>
+              </a:spcAft>
+              <a:defRPr/>
+            </a:pPr>
+            <a:r>
+              <a:rPr lang="en-US" sz="1200" dirty="0">
+                <a:solidFill>
+                  <a:schemeClr val="tx1"/>
+                </a:solidFill>
+                <a:latin typeface="Arial" panose="020B0604020202020204" pitchFamily="34" charset="0"/>
+                <a:cs typeface="Arial" panose="020B0604020202020204" pitchFamily="34" charset="0"/>
+              </a:rPr>
+              <a:t>Tenant Provisioning Service</a:t>
+            </a:r>
+          </a:p>
+        </p:txBody>
+      </p:sp>
+      <p:sp>
+        <p:nvSpPr>
+          <p:cNvPr id="16" name="TextBox 21">
+            <a:extLst>
+              <a:ext uri="{FF2B5EF4-FFF2-40B4-BE49-F238E27FC236}">
+                <a16:creationId xmlns:a16="http://schemas.microsoft.com/office/drawing/2014/main" id="{4E44D329-9EAB-46E1-ADB1-51262DEC0EC1}"/>
+              </a:ext>
+            </a:extLst>
+          </p:cNvPr>
+          <p:cNvSpPr txBox="1">
+            <a:spLocks noChangeArrowheads="1"/>
+          </p:cNvSpPr>
+          <p:nvPr/>
+        </p:nvSpPr>
+        <p:spPr bwMode="auto">
+          <a:xfrm>
+            <a:off x="6288514" y="3707295"/>
+            <a:ext cx="925513" cy="430887"/>
+          </a:xfrm>
+          <a:prstGeom prst="rect">
+            <a:avLst/>
+          </a:prstGeom>
+          <a:noFill/>
+          <a:ln>
+            <a:noFill/>
+          </a:ln>
+          <a:extLst>
+            <a:ext uri="{909E8E84-426E-40DD-AFC4-6F175D3DCCD1}">
+              <a14:hiddenFill xmlns:a14="http://schemas.microsoft.com/office/drawing/2010/main">
+                <a:solidFill>
+                  <a:srgbClr val="FFFFFF"/>
+                </a:solidFill>
+              </a14:hiddenFill>
+            </a:ext>
+            <a:ext uri="{91240B29-F687-4F45-9708-019B960494DF}">
+              <a14:hiddenLine xmlns:a14="http://schemas.microsoft.com/office/drawing/2010/main" w="9525">
+                <a:solidFill>
+                  <a:srgbClr val="000000"/>
+                </a:solidFill>
+                <a:miter lim="800000"/>
+                <a:headEnd/>
+                <a:tailEnd/>
+              </a14:hiddenLine>
+            </a:ext>
+          </a:extLst>
+        </p:spPr>
+        <p:txBody>
+          <a:bodyPr wrap="square">
+            <a:spAutoFit/>
+          </a:bodyPr>
+          <a:lstStyle>
+            <a:lvl1pPr>
+              <a:defRPr>
+                <a:solidFill>
+                  <a:schemeClr val="tx1"/>
+                </a:solidFill>
+                <a:latin typeface="Calibri" panose="020F0502020204030204" pitchFamily="34" charset="0"/>
+              </a:defRPr>
+            </a:lvl1pPr>
+            <a:lvl2pPr marL="742950" indent="-285750">
+              <a:defRPr>
+                <a:solidFill>
+                  <a:schemeClr val="tx1"/>
+                </a:solidFill>
+                <a:latin typeface="Calibri" panose="020F0502020204030204" pitchFamily="34" charset="0"/>
+              </a:defRPr>
+            </a:lvl2pPr>
+            <a:lvl3pPr marL="1143000" indent="-228600">
+              <a:defRPr>
+                <a:solidFill>
+                  <a:schemeClr val="tx1"/>
+                </a:solidFill>
+                <a:latin typeface="Calibri" panose="020F0502020204030204" pitchFamily="34" charset="0"/>
+              </a:defRPr>
+            </a:lvl3pPr>
+            <a:lvl4pPr marL="1600200" indent="-228600">
+              <a:defRPr>
+                <a:solidFill>
+                  <a:schemeClr val="tx1"/>
+                </a:solidFill>
+                <a:latin typeface="Calibri" panose="020F0502020204030204" pitchFamily="34" charset="0"/>
+              </a:defRPr>
+            </a:lvl4pPr>
+            <a:lvl5pPr marL="2057400" indent="-228600">
+              <a:defRPr>
+                <a:solidFill>
+                  <a:schemeClr val="tx1"/>
+                </a:solidFill>
+                <a:latin typeface="Calibri" panose="020F0502020204030204" pitchFamily="34" charset="0"/>
+              </a:defRPr>
+            </a:lvl5pPr>
+            <a:lvl6pPr marL="2514600" indent="-228600" eaLnBrk="0" fontAlgn="base" hangingPunct="0">
+              <a:spcBef>
+                <a:spcPct val="0"/>
+              </a:spcBef>
+              <a:spcAft>
+                <a:spcPct val="0"/>
+              </a:spcAft>
+              <a:defRPr>
+                <a:solidFill>
+                  <a:schemeClr val="tx1"/>
+                </a:solidFill>
+                <a:latin typeface="Calibri" panose="020F0502020204030204" pitchFamily="34" charset="0"/>
+              </a:defRPr>
+            </a:lvl6pPr>
+            <a:lvl7pPr marL="2971800" indent="-228600" eaLnBrk="0" fontAlgn="base" hangingPunct="0">
+              <a:spcBef>
+                <a:spcPct val="0"/>
+              </a:spcBef>
+              <a:spcAft>
+                <a:spcPct val="0"/>
+              </a:spcAft>
+              <a:defRPr>
+                <a:solidFill>
+                  <a:schemeClr val="tx1"/>
+                </a:solidFill>
+                <a:latin typeface="Calibri" panose="020F0502020204030204" pitchFamily="34" charset="0"/>
+              </a:defRPr>
+            </a:lvl7pPr>
+            <a:lvl8pPr marL="3429000" indent="-228600" eaLnBrk="0" fontAlgn="base" hangingPunct="0">
+              <a:spcBef>
+                <a:spcPct val="0"/>
+              </a:spcBef>
+              <a:spcAft>
+                <a:spcPct val="0"/>
+              </a:spcAft>
+              <a:defRPr>
+                <a:solidFill>
+                  <a:schemeClr val="tx1"/>
+                </a:solidFill>
+                <a:latin typeface="Calibri" panose="020F0502020204030204" pitchFamily="34" charset="0"/>
+              </a:defRPr>
+            </a:lvl8pPr>
+            <a:lvl9pPr marL="3886200" indent="-228600" eaLnBrk="0" fontAlgn="base" hangingPunct="0">
+              <a:spcBef>
+                <a:spcPct val="0"/>
+              </a:spcBef>
+              <a:spcAft>
+                <a:spcPct val="0"/>
+              </a:spcAft>
+              <a:defRPr>
+                <a:solidFill>
+                  <a:schemeClr val="tx1"/>
+                </a:solidFill>
+                <a:latin typeface="Calibri" panose="020F0502020204030204" pitchFamily="34" charset="0"/>
+              </a:defRPr>
+            </a:lvl9pPr>
+          </a:lstStyle>
+          <a:p>
+            <a:pPr algn="ctr" eaLnBrk="1" hangingPunct="1"/>
+            <a:r>
+              <a:rPr lang="en-US" altLang="en-US" sz="1100" dirty="0">
+                <a:latin typeface="Arial" panose="020B0604020202020204" pitchFamily="34" charset="0"/>
+                <a:ea typeface="Amazon Ember" panose="020B0603020204020204" pitchFamily="34" charset="0"/>
+                <a:cs typeface="Arial" panose="020B0604020202020204" pitchFamily="34" charset="0"/>
+              </a:rPr>
+              <a:t>AMC</a:t>
+            </a:r>
+            <a:br>
+              <a:rPr lang="en-US" altLang="en-US" sz="1100" dirty="0">
+                <a:latin typeface="Arial" panose="020B0604020202020204" pitchFamily="34" charset="0"/>
+                <a:ea typeface="Amazon Ember" panose="020B0603020204020204" pitchFamily="34" charset="0"/>
+                <a:cs typeface="Arial" panose="020B0604020202020204" pitchFamily="34" charset="0"/>
+              </a:rPr>
+            </a:br>
+            <a:r>
+              <a:rPr lang="en-US" altLang="en-US" sz="1100" dirty="0">
+                <a:latin typeface="Arial" panose="020B0604020202020204" pitchFamily="34" charset="0"/>
+                <a:ea typeface="Amazon Ember" panose="020B0603020204020204" pitchFamily="34" charset="0"/>
+                <a:cs typeface="Arial" panose="020B0604020202020204" pitchFamily="34" charset="0"/>
+              </a:rPr>
+              <a:t>S3 bucket</a:t>
+            </a:r>
+          </a:p>
+        </p:txBody>
+      </p:sp>
+      <p:pic>
+        <p:nvPicPr>
+          <p:cNvPr id="17" name="Graphic 14">
+            <a:extLst>
+              <a:ext uri="{FF2B5EF4-FFF2-40B4-BE49-F238E27FC236}">
+                <a16:creationId xmlns:a16="http://schemas.microsoft.com/office/drawing/2014/main" id="{6B517ABF-88E8-45B6-B7FD-7ACC7B184EF7}"/>
+              </a:ext>
+            </a:extLst>
+          </p:cNvPr>
+          <p:cNvPicPr>
+            <a:picLocks noChangeAspect="1" noChangeArrowheads="1"/>
+          </p:cNvPicPr>
+          <p:nvPr/>
+        </p:nvPicPr>
+        <p:blipFill>
+          <a:blip r:embed="rId5">
+            <a:extLst>
+              <a:ext uri="{28A0092B-C50C-407E-A947-70E740481C1C}">
+                <a14:useLocalDpi xmlns:a14="http://schemas.microsoft.com/office/drawing/2010/main" val="0"/>
+              </a:ext>
+            </a:extLst>
+          </a:blip>
+          <a:srcRect/>
+          <a:stretch>
+            <a:fillRect/>
+          </a:stretch>
+        </p:blipFill>
+        <p:spPr bwMode="auto">
+          <a:xfrm>
+            <a:off x="6538165" y="3269973"/>
+            <a:ext cx="457200" cy="457200"/>
+          </a:xfrm>
+          <a:prstGeom prst="rect">
+            <a:avLst/>
+          </a:prstGeom>
+          <a:noFill/>
+          <a:ln>
+            <a:noFill/>
+          </a:ln>
+          <a:extLst>
+            <a:ext uri="{909E8E84-426E-40DD-AFC4-6F175D3DCCD1}">
+              <a14:hiddenFill xmlns:a14="http://schemas.microsoft.com/office/drawing/2010/main">
+                <a:solidFill>
+                  <a:srgbClr val="FFFFFF"/>
+                </a:solidFill>
+              </a14:hiddenFill>
+            </a:ext>
+            <a:ext uri="{91240B29-F687-4F45-9708-019B960494DF}">
+              <a14:hiddenLine xmlns:a14="http://schemas.microsoft.com/office/drawing/2010/main" w="9525">
+                <a:solidFill>
+                  <a:srgbClr val="000000"/>
+                </a:solidFill>
+                <a:miter lim="800000"/>
+                <a:headEnd/>
+                <a:tailEnd/>
+              </a14:hiddenLine>
+            </a:ext>
+          </a:extLst>
+        </p:spPr>
+      </p:pic>
+      <p:sp>
+        <p:nvSpPr>
+          <p:cNvPr id="18" name="TextBox 17">
+            <a:extLst>
+              <a:ext uri="{FF2B5EF4-FFF2-40B4-BE49-F238E27FC236}">
+                <a16:creationId xmlns:a16="http://schemas.microsoft.com/office/drawing/2014/main" id="{57AE2E3D-DD83-404C-886E-79CE04D32C23}"/>
+              </a:ext>
+            </a:extLst>
+          </p:cNvPr>
+          <p:cNvSpPr txBox="1">
+            <a:spLocks noChangeArrowheads="1"/>
+          </p:cNvSpPr>
+          <p:nvPr/>
+        </p:nvSpPr>
+        <p:spPr bwMode="auto">
+          <a:xfrm>
+            <a:off x="3886206" y="2585844"/>
+            <a:ext cx="785469" cy="430887"/>
+          </a:xfrm>
+          <a:prstGeom prst="rect">
+            <a:avLst/>
+          </a:prstGeom>
+          <a:noFill/>
+          <a:ln>
+            <a:noFill/>
+          </a:ln>
+          <a:extLst>
+            <a:ext uri="{909E8E84-426E-40DD-AFC4-6F175D3DCCD1}">
+              <a14:hiddenFill xmlns:a14="http://schemas.microsoft.com/office/drawing/2010/main">
+                <a:solidFill>
+                  <a:srgbClr val="FFFFFF"/>
+                </a:solidFill>
+              </a14:hiddenFill>
+            </a:ext>
+            <a:ext uri="{91240B29-F687-4F45-9708-019B960494DF}">
+              <a14:hiddenLine xmlns:a14="http://schemas.microsoft.com/office/drawing/2010/main" w="9525">
+                <a:solidFill>
+                  <a:srgbClr val="000000"/>
+                </a:solidFill>
+                <a:miter lim="800000"/>
+                <a:headEnd/>
+                <a:tailEnd/>
+              </a14:hiddenLine>
+            </a:ext>
+          </a:extLst>
+        </p:spPr>
+        <p:txBody>
+          <a:bodyPr wrap="square">
+            <a:spAutoFit/>
+          </a:bodyPr>
+          <a:lstStyle>
+            <a:lvl1pPr>
+              <a:defRPr>
+                <a:solidFill>
+                  <a:schemeClr val="tx1"/>
+                </a:solidFill>
+                <a:latin typeface="Calibri" panose="020F0502020204030204" pitchFamily="34" charset="0"/>
+              </a:defRPr>
+            </a:lvl1pPr>
+            <a:lvl2pPr marL="742950" indent="-285750">
+              <a:defRPr>
+                <a:solidFill>
+                  <a:schemeClr val="tx1"/>
+                </a:solidFill>
+                <a:latin typeface="Calibri" panose="020F0502020204030204" pitchFamily="34" charset="0"/>
+              </a:defRPr>
+            </a:lvl2pPr>
+            <a:lvl3pPr marL="1143000" indent="-228600">
+              <a:defRPr>
+                <a:solidFill>
+                  <a:schemeClr val="tx1"/>
+                </a:solidFill>
+                <a:latin typeface="Calibri" panose="020F0502020204030204" pitchFamily="34" charset="0"/>
+              </a:defRPr>
+            </a:lvl3pPr>
+            <a:lvl4pPr marL="1600200" indent="-228600">
+              <a:defRPr>
+                <a:solidFill>
+                  <a:schemeClr val="tx1"/>
+                </a:solidFill>
+                <a:latin typeface="Calibri" panose="020F0502020204030204" pitchFamily="34" charset="0"/>
+              </a:defRPr>
+            </a:lvl4pPr>
+            <a:lvl5pPr marL="2057400" indent="-228600">
+              <a:defRPr>
+                <a:solidFill>
+                  <a:schemeClr val="tx1"/>
+                </a:solidFill>
+                <a:latin typeface="Calibri" panose="020F0502020204030204" pitchFamily="34" charset="0"/>
+              </a:defRPr>
+            </a:lvl5pPr>
+            <a:lvl6pPr marL="2514600" indent="-228600" eaLnBrk="0" fontAlgn="base" hangingPunct="0">
+              <a:spcBef>
+                <a:spcPct val="0"/>
+              </a:spcBef>
+              <a:spcAft>
+                <a:spcPct val="0"/>
+              </a:spcAft>
+              <a:defRPr>
+                <a:solidFill>
+                  <a:schemeClr val="tx1"/>
+                </a:solidFill>
+                <a:latin typeface="Calibri" panose="020F0502020204030204" pitchFamily="34" charset="0"/>
+              </a:defRPr>
+            </a:lvl6pPr>
+            <a:lvl7pPr marL="2971800" indent="-228600" eaLnBrk="0" fontAlgn="base" hangingPunct="0">
+              <a:spcBef>
+                <a:spcPct val="0"/>
+              </a:spcBef>
+              <a:spcAft>
+                <a:spcPct val="0"/>
+              </a:spcAft>
+              <a:defRPr>
+                <a:solidFill>
+                  <a:schemeClr val="tx1"/>
+                </a:solidFill>
+                <a:latin typeface="Calibri" panose="020F0502020204030204" pitchFamily="34" charset="0"/>
+              </a:defRPr>
+            </a:lvl7pPr>
+            <a:lvl8pPr marL="3429000" indent="-228600" eaLnBrk="0" fontAlgn="base" hangingPunct="0">
+              <a:spcBef>
+                <a:spcPct val="0"/>
+              </a:spcBef>
+              <a:spcAft>
+                <a:spcPct val="0"/>
+              </a:spcAft>
+              <a:defRPr>
+                <a:solidFill>
+                  <a:schemeClr val="tx1"/>
+                </a:solidFill>
+                <a:latin typeface="Calibri" panose="020F0502020204030204" pitchFamily="34" charset="0"/>
+              </a:defRPr>
+            </a:lvl8pPr>
+            <a:lvl9pPr marL="3886200" indent="-228600" eaLnBrk="0" fontAlgn="base" hangingPunct="0">
+              <a:spcBef>
+                <a:spcPct val="0"/>
+              </a:spcBef>
+              <a:spcAft>
+                <a:spcPct val="0"/>
+              </a:spcAft>
+              <a:defRPr>
+                <a:solidFill>
+                  <a:schemeClr val="tx1"/>
+                </a:solidFill>
+                <a:latin typeface="Calibri" panose="020F0502020204030204" pitchFamily="34" charset="0"/>
+              </a:defRPr>
+            </a:lvl9pPr>
+          </a:lstStyle>
+          <a:p>
+            <a:pPr algn="ctr" eaLnBrk="1" hangingPunct="1"/>
+            <a:r>
+              <a:rPr lang="en-US" altLang="en-US" sz="1100" dirty="0">
+                <a:latin typeface="Arial" panose="020B0604020202020204" pitchFamily="34" charset="0"/>
+                <a:ea typeface="Amazon Ember" panose="020B0603020204020204" pitchFamily="34" charset="0"/>
+                <a:cs typeface="Arial" panose="020B0604020202020204" pitchFamily="34" charset="0"/>
+              </a:rPr>
+              <a:t>Lamba</a:t>
+            </a:r>
+            <a:br>
+              <a:rPr lang="en-US" altLang="en-US" sz="1100" dirty="0">
+                <a:latin typeface="Arial" panose="020B0604020202020204" pitchFamily="34" charset="0"/>
+                <a:ea typeface="Amazon Ember" panose="020B0603020204020204" pitchFamily="34" charset="0"/>
+                <a:cs typeface="Arial" panose="020B0604020202020204" pitchFamily="34" charset="0"/>
+              </a:rPr>
+            </a:br>
+            <a:r>
+              <a:rPr lang="en-US" altLang="en-US" sz="1100" dirty="0">
+                <a:latin typeface="Arial" panose="020B0604020202020204" pitchFamily="34" charset="0"/>
+                <a:ea typeface="Amazon Ember" panose="020B0603020204020204" pitchFamily="34" charset="0"/>
+                <a:cs typeface="Arial" panose="020B0604020202020204" pitchFamily="34" charset="0"/>
+              </a:rPr>
+              <a:t>function</a:t>
+            </a:r>
+          </a:p>
+        </p:txBody>
+      </p:sp>
+      <p:pic>
+        <p:nvPicPr>
+          <p:cNvPr id="19" name="Graphic 13">
+            <a:extLst>
+              <a:ext uri="{FF2B5EF4-FFF2-40B4-BE49-F238E27FC236}">
+                <a16:creationId xmlns:a16="http://schemas.microsoft.com/office/drawing/2014/main" id="{B5DF2F55-E4F7-4B68-B41D-D8DF18318B4A}"/>
+              </a:ext>
+            </a:extLst>
+          </p:cNvPr>
+          <p:cNvPicPr>
+            <a:picLocks noChangeAspect="1" noChangeArrowheads="1"/>
+          </p:cNvPicPr>
+          <p:nvPr/>
+        </p:nvPicPr>
+        <p:blipFill>
+          <a:blip r:embed="rId6">
+            <a:extLst>
+              <a:ext uri="{28A0092B-C50C-407E-A947-70E740481C1C}">
+                <a14:useLocalDpi xmlns:a14="http://schemas.microsoft.com/office/drawing/2010/main" val="0"/>
+              </a:ext>
+            </a:extLst>
+          </a:blip>
+          <a:srcRect/>
+          <a:stretch>
+            <a:fillRect/>
+          </a:stretch>
+        </p:blipFill>
+        <p:spPr bwMode="auto">
+          <a:xfrm>
+            <a:off x="4058763" y="2136236"/>
+            <a:ext cx="457200" cy="457200"/>
+          </a:xfrm>
+          <a:prstGeom prst="rect">
+            <a:avLst/>
+          </a:prstGeom>
+          <a:noFill/>
+          <a:ln>
+            <a:noFill/>
+          </a:ln>
+          <a:extLst>
+            <a:ext uri="{909E8E84-426E-40DD-AFC4-6F175D3DCCD1}">
+              <a14:hiddenFill xmlns:a14="http://schemas.microsoft.com/office/drawing/2010/main">
+                <a:solidFill>
+                  <a:srgbClr val="FFFFFF"/>
+                </a:solidFill>
+              </a14:hiddenFill>
+            </a:ext>
+            <a:ext uri="{91240B29-F687-4F45-9708-019B960494DF}">
+              <a14:hiddenLine xmlns:a14="http://schemas.microsoft.com/office/drawing/2010/main" w="9525">
+                <a:solidFill>
+                  <a:srgbClr val="000000"/>
+                </a:solidFill>
+                <a:miter lim="800000"/>
+                <a:headEnd/>
+                <a:tailEnd/>
+              </a14:hiddenLine>
+            </a:ext>
+          </a:extLst>
+        </p:spPr>
+      </p:pic>
+      <p:pic>
+        <p:nvPicPr>
+          <p:cNvPr id="20" name="Graphic 23">
+            <a:extLst>
+              <a:ext uri="{FF2B5EF4-FFF2-40B4-BE49-F238E27FC236}">
+                <a16:creationId xmlns:a16="http://schemas.microsoft.com/office/drawing/2014/main" id="{3D78F3A8-D8EA-4B9A-A2C2-AC29572CCAE3}"/>
+              </a:ext>
+            </a:extLst>
+          </p:cNvPr>
+          <p:cNvPicPr>
+            <a:picLocks noChangeAspect="1" noChangeArrowheads="1"/>
+          </p:cNvPicPr>
+          <p:nvPr/>
+        </p:nvPicPr>
+        <p:blipFill>
+          <a:blip r:embed="rId7">
+            <a:extLst>
+              <a:ext uri="{28A0092B-C50C-407E-A947-70E740481C1C}">
+                <a14:useLocalDpi xmlns:a14="http://schemas.microsoft.com/office/drawing/2010/main" val="0"/>
+              </a:ext>
+            </a:extLst>
+          </a:blip>
+          <a:srcRect/>
+          <a:stretch>
+            <a:fillRect/>
+          </a:stretch>
+        </p:blipFill>
+        <p:spPr bwMode="auto">
+          <a:xfrm>
+            <a:off x="5027411" y="1995695"/>
+            <a:ext cx="762000" cy="762000"/>
+          </a:xfrm>
+          <a:prstGeom prst="rect">
+            <a:avLst/>
+          </a:prstGeom>
+          <a:noFill/>
+          <a:ln>
+            <a:noFill/>
+          </a:ln>
+          <a:extLst>
+            <a:ext uri="{909E8E84-426E-40DD-AFC4-6F175D3DCCD1}">
+              <a14:hiddenFill xmlns:a14="http://schemas.microsoft.com/office/drawing/2010/main">
+                <a:solidFill>
+                  <a:srgbClr val="FFFFFF"/>
+                </a:solidFill>
+              </a14:hiddenFill>
+            </a:ext>
+            <a:ext uri="{91240B29-F687-4F45-9708-019B960494DF}">
+              <a14:hiddenLine xmlns:a14="http://schemas.microsoft.com/office/drawing/2010/main" w="9525">
+                <a:solidFill>
+                  <a:srgbClr val="000000"/>
+                </a:solidFill>
+                <a:miter lim="800000"/>
+                <a:headEnd/>
+                <a:tailEnd/>
+              </a14:hiddenLine>
+            </a:ext>
+          </a:extLst>
+        </p:spPr>
+      </p:pic>
+      <p:sp>
+        <p:nvSpPr>
+          <p:cNvPr id="21" name="TextBox 12">
+            <a:extLst>
+              <a:ext uri="{FF2B5EF4-FFF2-40B4-BE49-F238E27FC236}">
+                <a16:creationId xmlns:a16="http://schemas.microsoft.com/office/drawing/2014/main" id="{5079D99D-E9EE-4EFC-89C1-680515EB3942}"/>
+              </a:ext>
+            </a:extLst>
+          </p:cNvPr>
+          <p:cNvSpPr txBox="1">
+            <a:spLocks noChangeArrowheads="1"/>
+          </p:cNvSpPr>
+          <p:nvPr/>
+        </p:nvSpPr>
+        <p:spPr bwMode="auto">
+          <a:xfrm>
+            <a:off x="4617628" y="2759282"/>
+            <a:ext cx="1580227" cy="276999"/>
+          </a:xfrm>
+          <a:prstGeom prst="rect">
+            <a:avLst/>
+          </a:prstGeom>
+          <a:noFill/>
+          <a:ln>
+            <a:noFill/>
+          </a:ln>
+          <a:extLst>
+            <a:ext uri="{909E8E84-426E-40DD-AFC4-6F175D3DCCD1}">
+              <a14:hiddenFill xmlns:a14="http://schemas.microsoft.com/office/drawing/2010/main">
+                <a:solidFill>
+                  <a:srgbClr val="FFFFFF"/>
+                </a:solidFill>
+              </a14:hiddenFill>
+            </a:ext>
+            <a:ext uri="{91240B29-F687-4F45-9708-019B960494DF}">
+              <a14:hiddenLine xmlns:a14="http://schemas.microsoft.com/office/drawing/2010/main" w="9525">
+                <a:solidFill>
+                  <a:srgbClr val="000000"/>
+                </a:solidFill>
+                <a:miter lim="800000"/>
+                <a:headEnd/>
+                <a:tailEnd/>
+              </a14:hiddenLine>
+            </a:ext>
+          </a:extLst>
+        </p:spPr>
+        <p:txBody>
+          <a:bodyPr wrap="square">
+            <a:spAutoFit/>
+          </a:bodyPr>
+          <a:lstStyle>
+            <a:lvl1pPr>
+              <a:defRPr>
+                <a:solidFill>
+                  <a:schemeClr val="tx1"/>
+                </a:solidFill>
+                <a:latin typeface="Calibri" panose="020F0502020204030204" pitchFamily="34" charset="0"/>
+              </a:defRPr>
+            </a:lvl1pPr>
+            <a:lvl2pPr marL="742950" indent="-285750">
+              <a:defRPr>
+                <a:solidFill>
+                  <a:schemeClr val="tx1"/>
+                </a:solidFill>
+                <a:latin typeface="Calibri" panose="020F0502020204030204" pitchFamily="34" charset="0"/>
+              </a:defRPr>
+            </a:lvl2pPr>
+            <a:lvl3pPr marL="1143000" indent="-228600">
+              <a:defRPr>
+                <a:solidFill>
+                  <a:schemeClr val="tx1"/>
+                </a:solidFill>
+                <a:latin typeface="Calibri" panose="020F0502020204030204" pitchFamily="34" charset="0"/>
+              </a:defRPr>
+            </a:lvl3pPr>
+            <a:lvl4pPr marL="1600200" indent="-228600">
+              <a:defRPr>
+                <a:solidFill>
+                  <a:schemeClr val="tx1"/>
+                </a:solidFill>
+                <a:latin typeface="Calibri" panose="020F0502020204030204" pitchFamily="34" charset="0"/>
+              </a:defRPr>
+            </a:lvl4pPr>
+            <a:lvl5pPr marL="2057400" indent="-228600">
+              <a:defRPr>
+                <a:solidFill>
+                  <a:schemeClr val="tx1"/>
+                </a:solidFill>
+                <a:latin typeface="Calibri" panose="020F0502020204030204" pitchFamily="34" charset="0"/>
+              </a:defRPr>
+            </a:lvl5pPr>
+            <a:lvl6pPr marL="2514600" indent="-228600" eaLnBrk="0" fontAlgn="base" hangingPunct="0">
+              <a:spcBef>
+                <a:spcPct val="0"/>
+              </a:spcBef>
+              <a:spcAft>
+                <a:spcPct val="0"/>
+              </a:spcAft>
+              <a:defRPr>
+                <a:solidFill>
+                  <a:schemeClr val="tx1"/>
+                </a:solidFill>
+                <a:latin typeface="Calibri" panose="020F0502020204030204" pitchFamily="34" charset="0"/>
+              </a:defRPr>
+            </a:lvl6pPr>
+            <a:lvl7pPr marL="2971800" indent="-228600" eaLnBrk="0" fontAlgn="base" hangingPunct="0">
+              <a:spcBef>
+                <a:spcPct val="0"/>
+              </a:spcBef>
+              <a:spcAft>
+                <a:spcPct val="0"/>
+              </a:spcAft>
+              <a:defRPr>
+                <a:solidFill>
+                  <a:schemeClr val="tx1"/>
+                </a:solidFill>
+                <a:latin typeface="Calibri" panose="020F0502020204030204" pitchFamily="34" charset="0"/>
+              </a:defRPr>
+            </a:lvl7pPr>
+            <a:lvl8pPr marL="3429000" indent="-228600" eaLnBrk="0" fontAlgn="base" hangingPunct="0">
+              <a:spcBef>
+                <a:spcPct val="0"/>
+              </a:spcBef>
+              <a:spcAft>
+                <a:spcPct val="0"/>
+              </a:spcAft>
+              <a:defRPr>
+                <a:solidFill>
+                  <a:schemeClr val="tx1"/>
+                </a:solidFill>
+                <a:latin typeface="Calibri" panose="020F0502020204030204" pitchFamily="34" charset="0"/>
+              </a:defRPr>
+            </a:lvl8pPr>
+            <a:lvl9pPr marL="3886200" indent="-228600" eaLnBrk="0" fontAlgn="base" hangingPunct="0">
+              <a:spcBef>
+                <a:spcPct val="0"/>
+              </a:spcBef>
+              <a:spcAft>
+                <a:spcPct val="0"/>
+              </a:spcAft>
+              <a:defRPr>
+                <a:solidFill>
+                  <a:schemeClr val="tx1"/>
+                </a:solidFill>
+                <a:latin typeface="Calibri" panose="020F0502020204030204" pitchFamily="34" charset="0"/>
+              </a:defRPr>
+            </a:lvl9pPr>
+          </a:lstStyle>
+          <a:p>
+            <a:pPr algn="ctr" eaLnBrk="1" hangingPunct="1"/>
+            <a:r>
+              <a:rPr lang="en-US" altLang="en-US" sz="1200" dirty="0">
+                <a:latin typeface="Arial" panose="020B0604020202020204" pitchFamily="34" charset="0"/>
+                <a:ea typeface="Amazon Ember" panose="020B0603020204020204" pitchFamily="34" charset="0"/>
+                <a:cs typeface="Arial" panose="020B0604020202020204" pitchFamily="34" charset="0"/>
+              </a:rPr>
+              <a:t>Amazon DynamoDB</a:t>
+            </a:r>
+          </a:p>
+        </p:txBody>
+      </p:sp>
+      <p:pic>
+        <p:nvPicPr>
+          <p:cNvPr id="22" name="Graphic 7">
+            <a:extLst>
+              <a:ext uri="{FF2B5EF4-FFF2-40B4-BE49-F238E27FC236}">
+                <a16:creationId xmlns:a16="http://schemas.microsoft.com/office/drawing/2014/main" id="{2548852C-CF2C-4E63-9DD0-42698603946E}"/>
+              </a:ext>
+            </a:extLst>
+          </p:cNvPr>
+          <p:cNvPicPr>
+            <a:picLocks noChangeAspect="1" noChangeArrowheads="1"/>
+          </p:cNvPicPr>
+          <p:nvPr/>
+        </p:nvPicPr>
+        <p:blipFill>
+          <a:blip r:embed="rId8">
+            <a:extLst>
+              <a:ext uri="{28A0092B-C50C-407E-A947-70E740481C1C}">
+                <a14:useLocalDpi xmlns:a14="http://schemas.microsoft.com/office/drawing/2010/main" val="0"/>
+              </a:ext>
+            </a:extLst>
+          </a:blip>
+          <a:srcRect/>
+          <a:stretch>
+            <a:fillRect/>
+          </a:stretch>
+        </p:blipFill>
+        <p:spPr bwMode="auto">
+          <a:xfrm>
+            <a:off x="10054709" y="1074957"/>
+            <a:ext cx="762000" cy="762000"/>
+          </a:xfrm>
+          <a:prstGeom prst="rect">
+            <a:avLst/>
+          </a:prstGeom>
+          <a:noFill/>
+          <a:ln>
+            <a:noFill/>
+          </a:ln>
+          <a:extLst>
+            <a:ext uri="{909E8E84-426E-40DD-AFC4-6F175D3DCCD1}">
+              <a14:hiddenFill xmlns:a14="http://schemas.microsoft.com/office/drawing/2010/main">
+                <a:solidFill>
+                  <a:srgbClr val="FFFFFF"/>
+                </a:solidFill>
+              </a14:hiddenFill>
+            </a:ext>
+            <a:ext uri="{91240B29-F687-4F45-9708-019B960494DF}">
+              <a14:hiddenLine xmlns:a14="http://schemas.microsoft.com/office/drawing/2010/main" w="9525">
+                <a:solidFill>
+                  <a:srgbClr val="000000"/>
+                </a:solidFill>
+                <a:miter lim="800000"/>
+                <a:headEnd/>
+                <a:tailEnd/>
+              </a14:hiddenLine>
+            </a:ext>
+          </a:extLst>
+        </p:spPr>
+      </p:pic>
+      <p:sp>
+        <p:nvSpPr>
+          <p:cNvPr id="23" name="TextBox 9">
+            <a:extLst>
+              <a:ext uri="{FF2B5EF4-FFF2-40B4-BE49-F238E27FC236}">
+                <a16:creationId xmlns:a16="http://schemas.microsoft.com/office/drawing/2014/main" id="{BAFD6FCD-DCAB-4C4B-9B97-596FDC2E2AB1}"/>
+              </a:ext>
+            </a:extLst>
+          </p:cNvPr>
+          <p:cNvSpPr txBox="1">
+            <a:spLocks noChangeArrowheads="1"/>
+          </p:cNvSpPr>
+          <p:nvPr/>
+        </p:nvSpPr>
+        <p:spPr bwMode="auto">
+          <a:xfrm>
+            <a:off x="9952912" y="1838544"/>
+            <a:ext cx="998873" cy="276999"/>
+          </a:xfrm>
+          <a:prstGeom prst="rect">
+            <a:avLst/>
+          </a:prstGeom>
+          <a:noFill/>
+          <a:ln>
+            <a:noFill/>
+          </a:ln>
+          <a:extLst>
+            <a:ext uri="{909E8E84-426E-40DD-AFC4-6F175D3DCCD1}">
+              <a14:hiddenFill xmlns:a14="http://schemas.microsoft.com/office/drawing/2010/main">
+                <a:solidFill>
+                  <a:srgbClr val="FFFFFF"/>
+                </a:solidFill>
+              </a14:hiddenFill>
+            </a:ext>
+            <a:ext uri="{91240B29-F687-4F45-9708-019B960494DF}">
+              <a14:hiddenLine xmlns:a14="http://schemas.microsoft.com/office/drawing/2010/main" w="9525">
+                <a:solidFill>
+                  <a:srgbClr val="000000"/>
+                </a:solidFill>
+                <a:miter lim="800000"/>
+                <a:headEnd/>
+                <a:tailEnd/>
+              </a14:hiddenLine>
+            </a:ext>
+          </a:extLst>
+        </p:spPr>
+        <p:txBody>
+          <a:bodyPr wrap="square">
+            <a:spAutoFit/>
+          </a:bodyPr>
+          <a:lstStyle>
+            <a:lvl1pPr>
+              <a:defRPr>
+                <a:solidFill>
+                  <a:schemeClr val="tx1"/>
+                </a:solidFill>
+                <a:latin typeface="Calibri" panose="020F0502020204030204" pitchFamily="34" charset="0"/>
+              </a:defRPr>
+            </a:lvl1pPr>
+            <a:lvl2pPr marL="742950" indent="-285750">
+              <a:defRPr>
+                <a:solidFill>
+                  <a:schemeClr val="tx1"/>
+                </a:solidFill>
+                <a:latin typeface="Calibri" panose="020F0502020204030204" pitchFamily="34" charset="0"/>
+              </a:defRPr>
+            </a:lvl2pPr>
+            <a:lvl3pPr marL="1143000" indent="-228600">
+              <a:defRPr>
+                <a:solidFill>
+                  <a:schemeClr val="tx1"/>
+                </a:solidFill>
+                <a:latin typeface="Calibri" panose="020F0502020204030204" pitchFamily="34" charset="0"/>
+              </a:defRPr>
+            </a:lvl3pPr>
+            <a:lvl4pPr marL="1600200" indent="-228600">
+              <a:defRPr>
+                <a:solidFill>
+                  <a:schemeClr val="tx1"/>
+                </a:solidFill>
+                <a:latin typeface="Calibri" panose="020F0502020204030204" pitchFamily="34" charset="0"/>
+              </a:defRPr>
+            </a:lvl4pPr>
+            <a:lvl5pPr marL="2057400" indent="-228600">
+              <a:defRPr>
+                <a:solidFill>
+                  <a:schemeClr val="tx1"/>
+                </a:solidFill>
+                <a:latin typeface="Calibri" panose="020F0502020204030204" pitchFamily="34" charset="0"/>
+              </a:defRPr>
+            </a:lvl5pPr>
+            <a:lvl6pPr marL="2514600" indent="-228600" eaLnBrk="0" fontAlgn="base" hangingPunct="0">
+              <a:spcBef>
+                <a:spcPct val="0"/>
+              </a:spcBef>
+              <a:spcAft>
+                <a:spcPct val="0"/>
+              </a:spcAft>
+              <a:defRPr>
+                <a:solidFill>
+                  <a:schemeClr val="tx1"/>
+                </a:solidFill>
+                <a:latin typeface="Calibri" panose="020F0502020204030204" pitchFamily="34" charset="0"/>
+              </a:defRPr>
+            </a:lvl6pPr>
+            <a:lvl7pPr marL="2971800" indent="-228600" eaLnBrk="0" fontAlgn="base" hangingPunct="0">
+              <a:spcBef>
+                <a:spcPct val="0"/>
+              </a:spcBef>
+              <a:spcAft>
+                <a:spcPct val="0"/>
+              </a:spcAft>
+              <a:defRPr>
+                <a:solidFill>
+                  <a:schemeClr val="tx1"/>
+                </a:solidFill>
+                <a:latin typeface="Calibri" panose="020F0502020204030204" pitchFamily="34" charset="0"/>
+              </a:defRPr>
+            </a:lvl7pPr>
+            <a:lvl8pPr marL="3429000" indent="-228600" eaLnBrk="0" fontAlgn="base" hangingPunct="0">
+              <a:spcBef>
+                <a:spcPct val="0"/>
+              </a:spcBef>
+              <a:spcAft>
+                <a:spcPct val="0"/>
+              </a:spcAft>
+              <a:defRPr>
+                <a:solidFill>
+                  <a:schemeClr val="tx1"/>
+                </a:solidFill>
+                <a:latin typeface="Calibri" panose="020F0502020204030204" pitchFamily="34" charset="0"/>
+              </a:defRPr>
+            </a:lvl8pPr>
+            <a:lvl9pPr marL="3886200" indent="-228600" eaLnBrk="0" fontAlgn="base" hangingPunct="0">
+              <a:spcBef>
+                <a:spcPct val="0"/>
+              </a:spcBef>
+              <a:spcAft>
+                <a:spcPct val="0"/>
+              </a:spcAft>
+              <a:defRPr>
+                <a:solidFill>
+                  <a:schemeClr val="tx1"/>
+                </a:solidFill>
+                <a:latin typeface="Calibri" panose="020F0502020204030204" pitchFamily="34" charset="0"/>
+              </a:defRPr>
+            </a:lvl9pPr>
+          </a:lstStyle>
+          <a:p>
+            <a:pPr algn="ctr" eaLnBrk="1" hangingPunct="1"/>
+            <a:r>
+              <a:rPr lang="en-US" altLang="en-US" sz="1200" dirty="0">
+                <a:latin typeface="Arial" panose="020B0604020202020204" pitchFamily="34" charset="0"/>
+                <a:ea typeface="Amazon Ember" panose="020B0603020204020204" pitchFamily="34" charset="0"/>
+                <a:cs typeface="Arial" panose="020B0604020202020204" pitchFamily="34" charset="0"/>
+              </a:rPr>
+              <a:t>AWS KMS</a:t>
+            </a:r>
+          </a:p>
+        </p:txBody>
+      </p:sp>
+      <p:sp>
+        <p:nvSpPr>
+          <p:cNvPr id="24" name="TextBox 21">
+            <a:extLst>
+              <a:ext uri="{FF2B5EF4-FFF2-40B4-BE49-F238E27FC236}">
+                <a16:creationId xmlns:a16="http://schemas.microsoft.com/office/drawing/2014/main" id="{34D234F5-99AD-4BB5-8F30-119D38FC73B0}"/>
+              </a:ext>
+            </a:extLst>
+          </p:cNvPr>
+          <p:cNvSpPr txBox="1">
+            <a:spLocks noChangeArrowheads="1"/>
+          </p:cNvSpPr>
+          <p:nvPr/>
+        </p:nvSpPr>
+        <p:spPr bwMode="auto">
+          <a:xfrm>
+            <a:off x="975377" y="168048"/>
+            <a:ext cx="10626274" cy="600164"/>
+          </a:xfrm>
+          <a:prstGeom prst="rect">
+            <a:avLst/>
+          </a:prstGeom>
+          <a:noFill/>
+          <a:ln>
+            <a:noFill/>
+          </a:ln>
+          <a:extLst>
+            <a:ext uri="{909E8E84-426E-40DD-AFC4-6F175D3DCCD1}">
+              <a14:hiddenFill xmlns:a14="http://schemas.microsoft.com/office/drawing/2010/main">
+                <a:solidFill>
+                  <a:srgbClr val="FFFFFF"/>
+                </a:solidFill>
+              </a14:hiddenFill>
+            </a:ext>
+            <a:ext uri="{91240B29-F687-4F45-9708-019B960494DF}">
+              <a14:hiddenLine xmlns:a14="http://schemas.microsoft.com/office/drawing/2010/main" w="9525">
+                <a:solidFill>
+                  <a:srgbClr val="000000"/>
+                </a:solidFill>
+                <a:miter lim="800000"/>
+                <a:headEnd/>
+                <a:tailEnd/>
+              </a14:hiddenLine>
+            </a:ext>
+          </a:extLst>
+        </p:spPr>
+        <p:txBody>
+          <a:bodyPr wrap="square">
+            <a:spAutoFit/>
+          </a:bodyPr>
+          <a:lstStyle>
+            <a:lvl1pPr>
+              <a:defRPr>
+                <a:solidFill>
+                  <a:schemeClr val="tx1"/>
+                </a:solidFill>
+                <a:latin typeface="Calibri" panose="020F0502020204030204" pitchFamily="34" charset="0"/>
+              </a:defRPr>
+            </a:lvl1pPr>
+            <a:lvl2pPr marL="742950" indent="-285750">
+              <a:defRPr>
+                <a:solidFill>
+                  <a:schemeClr val="tx1"/>
+                </a:solidFill>
+                <a:latin typeface="Calibri" panose="020F0502020204030204" pitchFamily="34" charset="0"/>
+              </a:defRPr>
+            </a:lvl2pPr>
+            <a:lvl3pPr marL="1143000" indent="-228600">
+              <a:defRPr>
+                <a:solidFill>
+                  <a:schemeClr val="tx1"/>
+                </a:solidFill>
+                <a:latin typeface="Calibri" panose="020F0502020204030204" pitchFamily="34" charset="0"/>
+              </a:defRPr>
+            </a:lvl3pPr>
+            <a:lvl4pPr marL="1600200" indent="-228600">
+              <a:defRPr>
+                <a:solidFill>
+                  <a:schemeClr val="tx1"/>
+                </a:solidFill>
+                <a:latin typeface="Calibri" panose="020F0502020204030204" pitchFamily="34" charset="0"/>
+              </a:defRPr>
+            </a:lvl4pPr>
+            <a:lvl5pPr marL="2057400" indent="-228600">
+              <a:defRPr>
+                <a:solidFill>
+                  <a:schemeClr val="tx1"/>
+                </a:solidFill>
+                <a:latin typeface="Calibri" panose="020F0502020204030204" pitchFamily="34" charset="0"/>
+              </a:defRPr>
+            </a:lvl5pPr>
+            <a:lvl6pPr marL="2514600" indent="-228600" eaLnBrk="0" fontAlgn="base" hangingPunct="0">
+              <a:spcBef>
+                <a:spcPct val="0"/>
+              </a:spcBef>
+              <a:spcAft>
+                <a:spcPct val="0"/>
+              </a:spcAft>
+              <a:defRPr>
+                <a:solidFill>
+                  <a:schemeClr val="tx1"/>
+                </a:solidFill>
+                <a:latin typeface="Calibri" panose="020F0502020204030204" pitchFamily="34" charset="0"/>
+              </a:defRPr>
+            </a:lvl6pPr>
+            <a:lvl7pPr marL="2971800" indent="-228600" eaLnBrk="0" fontAlgn="base" hangingPunct="0">
+              <a:spcBef>
+                <a:spcPct val="0"/>
+              </a:spcBef>
+              <a:spcAft>
+                <a:spcPct val="0"/>
+              </a:spcAft>
+              <a:defRPr>
+                <a:solidFill>
+                  <a:schemeClr val="tx1"/>
+                </a:solidFill>
+                <a:latin typeface="Calibri" panose="020F0502020204030204" pitchFamily="34" charset="0"/>
+              </a:defRPr>
+            </a:lvl7pPr>
+            <a:lvl8pPr marL="3429000" indent="-228600" eaLnBrk="0" fontAlgn="base" hangingPunct="0">
+              <a:spcBef>
+                <a:spcPct val="0"/>
+              </a:spcBef>
+              <a:spcAft>
+                <a:spcPct val="0"/>
+              </a:spcAft>
+              <a:defRPr>
+                <a:solidFill>
+                  <a:schemeClr val="tx1"/>
+                </a:solidFill>
+                <a:latin typeface="Calibri" panose="020F0502020204030204" pitchFamily="34" charset="0"/>
+              </a:defRPr>
+            </a:lvl8pPr>
+            <a:lvl9pPr marL="3886200" indent="-228600" eaLnBrk="0" fontAlgn="base" hangingPunct="0">
+              <a:spcBef>
+                <a:spcPct val="0"/>
+              </a:spcBef>
+              <a:spcAft>
+                <a:spcPct val="0"/>
+              </a:spcAft>
+              <a:defRPr>
+                <a:solidFill>
+                  <a:schemeClr val="tx1"/>
+                </a:solidFill>
+                <a:latin typeface="Calibri" panose="020F0502020204030204" pitchFamily="34" charset="0"/>
+              </a:defRPr>
+            </a:lvl9pPr>
+          </a:lstStyle>
+          <a:p>
+            <a:pPr eaLnBrk="1" hangingPunct="1"/>
+            <a:r>
+              <a:rPr lang="en-US" altLang="en-US" sz="1100" dirty="0">
+                <a:solidFill>
+                  <a:srgbClr val="FF0000"/>
+                </a:solidFill>
+                <a:latin typeface="Arial" panose="020B0604020202020204" pitchFamily="34" charset="0"/>
+                <a:ea typeface="Amazon Ember" panose="020B0603020204020204" pitchFamily="34" charset="0"/>
+                <a:cs typeface="Arial" panose="020B0604020202020204" pitchFamily="34" charset="0"/>
+              </a:rPr>
+              <a:t>Andrew, Please redo this diagram per our wiki instructions. For example, copy and paste all components directly from the latest icon toolkit deck. I’ve made a start here to give you an idea. Match icons, sizes, fonts, boxes, arrows … everything. Don’t use old icons or swap in icons from elsewhere. Don’t change icon or font sizes. </a:t>
+            </a:r>
+            <a:br>
+              <a:rPr lang="en-US" altLang="en-US" sz="1100" dirty="0">
+                <a:solidFill>
+                  <a:srgbClr val="FF0000"/>
+                </a:solidFill>
+                <a:latin typeface="Arial" panose="020B0604020202020204" pitchFamily="34" charset="0"/>
+                <a:ea typeface="Amazon Ember" panose="020B0603020204020204" pitchFamily="34" charset="0"/>
+                <a:cs typeface="Arial" panose="020B0604020202020204" pitchFamily="34" charset="0"/>
+              </a:rPr>
+            </a:br>
+            <a:r>
+              <a:rPr lang="en-US" altLang="en-US" sz="1100" dirty="0">
+                <a:solidFill>
+                  <a:srgbClr val="FF0000"/>
+                </a:solidFill>
+                <a:latin typeface="Arial" panose="020B0604020202020204" pitchFamily="34" charset="0"/>
+                <a:ea typeface="Amazon Ember" panose="020B0603020204020204" pitchFamily="34" charset="0"/>
+                <a:cs typeface="Arial" panose="020B0604020202020204" pitchFamily="34" charset="0"/>
+              </a:rPr>
+              <a:t>Don’t make up your own lines. Build on this slide I’ve started. When you’re done, send back an </a:t>
+            </a:r>
+            <a:r>
+              <a:rPr lang="en-US" altLang="en-US" sz="1100" i="1" dirty="0">
+                <a:solidFill>
+                  <a:srgbClr val="FF0000"/>
+                </a:solidFill>
+                <a:latin typeface="Arial" panose="020B0604020202020204" pitchFamily="34" charset="0"/>
+                <a:ea typeface="Amazon Ember" panose="020B0603020204020204" pitchFamily="34" charset="0"/>
+                <a:cs typeface="Arial" panose="020B0604020202020204" pitchFamily="34" charset="0"/>
+              </a:rPr>
+              <a:t>editable</a:t>
+            </a:r>
+            <a:r>
+              <a:rPr lang="en-US" altLang="en-US" sz="1100" dirty="0">
+                <a:solidFill>
+                  <a:srgbClr val="FF0000"/>
+                </a:solidFill>
+                <a:latin typeface="Arial" panose="020B0604020202020204" pitchFamily="34" charset="0"/>
+                <a:ea typeface="Amazon Ember" panose="020B0603020204020204" pitchFamily="34" charset="0"/>
+                <a:cs typeface="Arial" panose="020B0604020202020204" pitchFamily="34" charset="0"/>
+              </a:rPr>
+              <a:t> .pptx file, not a pasted-in image of the diagram.</a:t>
+            </a:r>
+          </a:p>
+        </p:txBody>
+      </p:sp>
+      <p:sp>
+        <p:nvSpPr>
+          <p:cNvPr id="25" name="TextBox 21">
+            <a:extLst>
+              <a:ext uri="{FF2B5EF4-FFF2-40B4-BE49-F238E27FC236}">
+                <a16:creationId xmlns:a16="http://schemas.microsoft.com/office/drawing/2014/main" id="{D3543E91-6471-4D3A-9A1B-DD2DD6C0A319}"/>
+              </a:ext>
+            </a:extLst>
+          </p:cNvPr>
+          <p:cNvSpPr txBox="1">
+            <a:spLocks noChangeArrowheads="1"/>
+          </p:cNvSpPr>
+          <p:nvPr/>
+        </p:nvSpPr>
+        <p:spPr bwMode="auto">
+          <a:xfrm>
+            <a:off x="7637106" y="3429000"/>
+            <a:ext cx="3504659" cy="600164"/>
+          </a:xfrm>
+          <a:prstGeom prst="rect">
+            <a:avLst/>
+          </a:prstGeom>
+          <a:noFill/>
+          <a:ln>
+            <a:noFill/>
+          </a:ln>
+          <a:extLst>
+            <a:ext uri="{909E8E84-426E-40DD-AFC4-6F175D3DCCD1}">
+              <a14:hiddenFill xmlns:a14="http://schemas.microsoft.com/office/drawing/2010/main">
+                <a:solidFill>
+                  <a:srgbClr val="FFFFFF"/>
+                </a:solidFill>
+              </a14:hiddenFill>
+            </a:ext>
+            <a:ext uri="{91240B29-F687-4F45-9708-019B960494DF}">
+              <a14:hiddenLine xmlns:a14="http://schemas.microsoft.com/office/drawing/2010/main" w="9525">
+                <a:solidFill>
+                  <a:srgbClr val="000000"/>
+                </a:solidFill>
+                <a:miter lim="800000"/>
+                <a:headEnd/>
+                <a:tailEnd/>
+              </a14:hiddenLine>
+            </a:ext>
+          </a:extLst>
+        </p:spPr>
+        <p:txBody>
+          <a:bodyPr wrap="square">
+            <a:spAutoFit/>
+          </a:bodyPr>
+          <a:lstStyle>
+            <a:lvl1pPr>
+              <a:defRPr>
+                <a:solidFill>
+                  <a:schemeClr val="tx1"/>
+                </a:solidFill>
+                <a:latin typeface="Calibri" panose="020F0502020204030204" pitchFamily="34" charset="0"/>
+              </a:defRPr>
+            </a:lvl1pPr>
+            <a:lvl2pPr marL="742950" indent="-285750">
+              <a:defRPr>
+                <a:solidFill>
+                  <a:schemeClr val="tx1"/>
+                </a:solidFill>
+                <a:latin typeface="Calibri" panose="020F0502020204030204" pitchFamily="34" charset="0"/>
+              </a:defRPr>
+            </a:lvl2pPr>
+            <a:lvl3pPr marL="1143000" indent="-228600">
+              <a:defRPr>
+                <a:solidFill>
+                  <a:schemeClr val="tx1"/>
+                </a:solidFill>
+                <a:latin typeface="Calibri" panose="020F0502020204030204" pitchFamily="34" charset="0"/>
+              </a:defRPr>
+            </a:lvl3pPr>
+            <a:lvl4pPr marL="1600200" indent="-228600">
+              <a:defRPr>
+                <a:solidFill>
+                  <a:schemeClr val="tx1"/>
+                </a:solidFill>
+                <a:latin typeface="Calibri" panose="020F0502020204030204" pitchFamily="34" charset="0"/>
+              </a:defRPr>
+            </a:lvl4pPr>
+            <a:lvl5pPr marL="2057400" indent="-228600">
+              <a:defRPr>
+                <a:solidFill>
+                  <a:schemeClr val="tx1"/>
+                </a:solidFill>
+                <a:latin typeface="Calibri" panose="020F0502020204030204" pitchFamily="34" charset="0"/>
+              </a:defRPr>
+            </a:lvl5pPr>
+            <a:lvl6pPr marL="2514600" indent="-228600" eaLnBrk="0" fontAlgn="base" hangingPunct="0">
+              <a:spcBef>
+                <a:spcPct val="0"/>
+              </a:spcBef>
+              <a:spcAft>
+                <a:spcPct val="0"/>
+              </a:spcAft>
+              <a:defRPr>
+                <a:solidFill>
+                  <a:schemeClr val="tx1"/>
+                </a:solidFill>
+                <a:latin typeface="Calibri" panose="020F0502020204030204" pitchFamily="34" charset="0"/>
+              </a:defRPr>
+            </a:lvl6pPr>
+            <a:lvl7pPr marL="2971800" indent="-228600" eaLnBrk="0" fontAlgn="base" hangingPunct="0">
+              <a:spcBef>
+                <a:spcPct val="0"/>
+              </a:spcBef>
+              <a:spcAft>
+                <a:spcPct val="0"/>
+              </a:spcAft>
+              <a:defRPr>
+                <a:solidFill>
+                  <a:schemeClr val="tx1"/>
+                </a:solidFill>
+                <a:latin typeface="Calibri" panose="020F0502020204030204" pitchFamily="34" charset="0"/>
+              </a:defRPr>
+            </a:lvl7pPr>
+            <a:lvl8pPr marL="3429000" indent="-228600" eaLnBrk="0" fontAlgn="base" hangingPunct="0">
+              <a:spcBef>
+                <a:spcPct val="0"/>
+              </a:spcBef>
+              <a:spcAft>
+                <a:spcPct val="0"/>
+              </a:spcAft>
+              <a:defRPr>
+                <a:solidFill>
+                  <a:schemeClr val="tx1"/>
+                </a:solidFill>
+                <a:latin typeface="Calibri" panose="020F0502020204030204" pitchFamily="34" charset="0"/>
+              </a:defRPr>
+            </a:lvl8pPr>
+            <a:lvl9pPr marL="3886200" indent="-228600" eaLnBrk="0" fontAlgn="base" hangingPunct="0">
+              <a:spcBef>
+                <a:spcPct val="0"/>
+              </a:spcBef>
+              <a:spcAft>
+                <a:spcPct val="0"/>
+              </a:spcAft>
+              <a:defRPr>
+                <a:solidFill>
+                  <a:schemeClr val="tx1"/>
+                </a:solidFill>
+                <a:latin typeface="Calibri" panose="020F0502020204030204" pitchFamily="34" charset="0"/>
+              </a:defRPr>
+            </a:lvl9pPr>
+          </a:lstStyle>
+          <a:p>
+            <a:pPr eaLnBrk="1" hangingPunct="1"/>
+            <a:r>
+              <a:rPr lang="en-US" altLang="en-US" sz="1100" dirty="0">
+                <a:solidFill>
+                  <a:srgbClr val="FF0000"/>
+                </a:solidFill>
+                <a:latin typeface="Arial" panose="020B0604020202020204" pitchFamily="34" charset="0"/>
+                <a:ea typeface="Amazon Ember" panose="020B0603020204020204" pitchFamily="34" charset="0"/>
+                <a:cs typeface="Arial" panose="020B0604020202020204" pitchFamily="34" charset="0"/>
+              </a:rPr>
+              <a:t>Andrew, The instructions say “deploy this architecture in the same account as your AMC instance.” </a:t>
+            </a:r>
+            <a:br>
+              <a:rPr lang="en-US" altLang="en-US" sz="1100" dirty="0">
+                <a:solidFill>
+                  <a:srgbClr val="FF0000"/>
+                </a:solidFill>
+                <a:latin typeface="Arial" panose="020B0604020202020204" pitchFamily="34" charset="0"/>
+                <a:ea typeface="Amazon Ember" panose="020B0603020204020204" pitchFamily="34" charset="0"/>
+                <a:cs typeface="Arial" panose="020B0604020202020204" pitchFamily="34" charset="0"/>
+              </a:rPr>
+            </a:br>
+            <a:r>
+              <a:rPr lang="en-US" altLang="en-US" sz="1100" dirty="0">
+                <a:solidFill>
+                  <a:srgbClr val="FF0000"/>
+                </a:solidFill>
+                <a:latin typeface="Arial" panose="020B0604020202020204" pitchFamily="34" charset="0"/>
+                <a:ea typeface="Amazon Ember" panose="020B0603020204020204" pitchFamily="34" charset="0"/>
+                <a:cs typeface="Arial" panose="020B0604020202020204" pitchFamily="34" charset="0"/>
+              </a:rPr>
+              <a:t>How could we show the AMC instance here? </a:t>
+            </a:r>
+          </a:p>
+        </p:txBody>
+      </p:sp>
+    </p:spTree>
+    <p:extLst>
+      <p:ext uri="{BB962C8B-B14F-4D97-AF65-F5344CB8AC3E}">
+        <p14:creationId xmlns:p14="http://schemas.microsoft.com/office/powerpoint/2010/main" val="2015242355"/>
+      </p:ext>
+    </p:extLst>
+  </p:cSld>
+  <p:clrMapOvr>
+    <a:masterClrMapping/>
+  </p:clrMapOvr>
+</p:sld>
+</file>
+
+<file path=ppt/slides/slide2.xml><?xml version="1.0" encoding="utf-8"?>
+<p:sld xmlns:a="http://schemas.openxmlformats.org/drawingml/2006/main" xmlns:r="http://schemas.openxmlformats.org/officeDocument/2006/relationships" xmlns:p="http://schemas.openxmlformats.org/presentationml/2006/main">
+  <p:cSld>
+    <p:spTree>
+      <p:nvGrpSpPr>
+        <p:cNvPr id="1" name=""/>
+        <p:cNvGrpSpPr/>
+        <p:nvPr/>
+      </p:nvGrpSpPr>
+      <p:grpSpPr>
+        <a:xfrm>
+          <a:off x="0" y="0"/>
+          <a:ext cx="0" cy="0"/>
+          <a:chOff x="0" y="0"/>
+          <a:chExt cx="0" cy="0"/>
+        </a:xfrm>
+      </p:grpSpPr>
       <p:pic>
         <p:nvPicPr>
           <p:cNvPr id="3" name="Picture 2">
@@ -3359,7 +5463,7 @@
     </p:spTree>
     <p:extLst>
       <p:ext uri="{BB962C8B-B14F-4D97-AF65-F5344CB8AC3E}">
-        <p14:creationId xmlns:p14="http://schemas.microsoft.com/office/powerpoint/2010/main" val="1821719855"/>
+        <p14:creationId xmlns:p14="http://schemas.microsoft.com/office/powerpoint/2010/main" val="2467863456"/>
       </p:ext>
     </p:extLst>
   </p:cSld>

</xml_diff>